<commit_message>
commit slide of Duc
</commit_message>
<xml_diff>
--- a/QS_Training_AngularJS_Yeoman, Grunt, Gulp - SonVQ.pptx
+++ b/QS_Training_AngularJS_Yeoman, Grunt, Gulp - SonVQ.pptx
@@ -5,15 +5,16 @@
     <p:sldMasterId id="2147485495" r:id="rId1"/>
   </p:sldMasterIdLst>
   <p:notesMasterIdLst>
-    <p:notesMasterId r:id="rId5"/>
+    <p:notesMasterId r:id="rId6"/>
   </p:notesMasterIdLst>
   <p:handoutMasterIdLst>
-    <p:handoutMasterId r:id="rId6"/>
+    <p:handoutMasterId r:id="rId7"/>
   </p:handoutMasterIdLst>
   <p:sldIdLst>
     <p:sldId id="256" r:id="rId2"/>
-    <p:sldId id="393" r:id="rId3"/>
-    <p:sldId id="333" r:id="rId4"/>
+    <p:sldId id="394" r:id="rId3"/>
+    <p:sldId id="393" r:id="rId4"/>
+    <p:sldId id="333" r:id="rId5"/>
   </p:sldIdLst>
   <p:sldSz cx="9144000" cy="6858000" type="screen4x3"/>
   <p:notesSz cx="6858000" cy="9144000"/>
@@ -114,7 +115,7 @@
   </p:defaultTextStyle>
   <p:extLst>
     <p:ext uri="{EFAFB233-063F-42B5-8137-9DF3F51BA10A}">
-      <p15:sldGuideLst xmlns="" xmlns:p15="http://schemas.microsoft.com/office/powerpoint/2012/main">
+      <p15:sldGuideLst xmlns:p15="http://schemas.microsoft.com/office/powerpoint/2012/main" xmlns="">
         <p15:guide id="1" orient="horz" pos="2160">
           <p15:clr>
             <a:srgbClr val="A4A3A4"/>
@@ -214,7 +215,7 @@
             <a:fld id="{AEC239D8-9946-CA43-8D24-8F75F9EC746F}" type="datetimeFigureOut">
               <a:rPr lang="en-US" smtClean="0"/>
               <a:pPr/>
-              <a:t>5/18/2016</a:t>
+              <a:t>5/20/2016</a:t>
             </a:fld>
             <a:endParaRPr lang="en-US"/>
           </a:p>
@@ -290,7 +291,7 @@
     </p:spTree>
     <p:extLst>
       <p:ext uri="{BB962C8B-B14F-4D97-AF65-F5344CB8AC3E}">
-        <p14:creationId xmlns="" xmlns:p14="http://schemas.microsoft.com/office/powerpoint/2010/main" val="3557071831"/>
+        <p14:creationId xmlns:p14="http://schemas.microsoft.com/office/powerpoint/2010/main" xmlns="" val="3557071831"/>
       </p:ext>
     </p:extLst>
   </p:cSld>
@@ -382,7 +383,7 @@
             <a:fld id="{30D3C4F2-547F-4EAC-A4FB-1991884D518B}" type="datetimeFigureOut">
               <a:rPr lang="en-US" smtClean="0"/>
               <a:pPr/>
-              <a:t>5/18/2016</a:t>
+              <a:t>5/20/2016</a:t>
             </a:fld>
             <a:endParaRPr lang="en-US"/>
           </a:p>
@@ -553,7 +554,7 @@
     </p:spTree>
     <p:extLst>
       <p:ext uri="{BB962C8B-B14F-4D97-AF65-F5344CB8AC3E}">
-        <p14:creationId xmlns="" xmlns:p14="http://schemas.microsoft.com/office/powerpoint/2010/main" val="967518016"/>
+        <p14:creationId xmlns:p14="http://schemas.microsoft.com/office/powerpoint/2010/main" xmlns="" val="967518016"/>
       </p:ext>
     </p:extLst>
   </p:cSld>
@@ -729,7 +730,7 @@
     </p:spTree>
     <p:extLst>
       <p:ext uri="{BB962C8B-B14F-4D97-AF65-F5344CB8AC3E}">
-        <p14:creationId xmlns="" xmlns:p14="http://schemas.microsoft.com/office/powerpoint/2010/main" val="1083453538"/>
+        <p14:creationId xmlns:p14="http://schemas.microsoft.com/office/powerpoint/2010/main" xmlns="" val="1083453538"/>
       </p:ext>
     </p:extLst>
   </p:cSld>
@@ -925,7 +926,7 @@
             <a:fld id="{8695E4D3-92F1-F74E-BDA8-3EA24612ADAC}" type="datetime2">
               <a:rPr lang="en-US" smtClean="0"/>
               <a:pPr/>
-              <a:t>Wednesday, May 18, 2016</a:t>
+              <a:t>Friday, May 20, 2016</a:t>
             </a:fld>
             <a:endParaRPr lang="en-US"/>
           </a:p>
@@ -992,7 +993,7 @@
     <a:masterClrMapping/>
   </p:clrMapOvr>
   <mc:AlternateContent xmlns:mc="http://schemas.openxmlformats.org/markup-compatibility/2006">
-    <mc:Choice xmlns="" xmlns:p14="http://schemas.microsoft.com/office/powerpoint/2010/main" Requires="p14">
+    <mc:Choice xmlns:p14="http://schemas.microsoft.com/office/powerpoint/2010/main" xmlns="" Requires="p14">
       <p:transition p14:dur="100">
         <p:cut/>
       </p:transition>
@@ -1120,7 +1121,7 @@
             <a:fld id="{9358C7B7-FC72-9D41-BEE1-BB86D4F232B4}" type="datetime2">
               <a:rPr lang="en-US" smtClean="0"/>
               <a:pPr/>
-              <a:t>Wednesday, May 18, 2016</a:t>
+              <a:t>Friday, May 20, 2016</a:t>
             </a:fld>
             <a:endParaRPr lang="en-US"/>
           </a:p>
@@ -1187,7 +1188,7 @@
     <a:masterClrMapping/>
   </p:clrMapOvr>
   <mc:AlternateContent xmlns:mc="http://schemas.openxmlformats.org/markup-compatibility/2006">
-    <mc:Choice xmlns="" xmlns:p14="http://schemas.microsoft.com/office/powerpoint/2010/main" Requires="p14">
+    <mc:Choice xmlns:p14="http://schemas.microsoft.com/office/powerpoint/2010/main" xmlns="" Requires="p14">
       <p:transition p14:dur="100">
         <p:cut/>
       </p:transition>
@@ -1325,7 +1326,7 @@
             <a:fld id="{556E821B-96E8-764D-BF74-9827494534E4}" type="datetime2">
               <a:rPr lang="en-US" smtClean="0"/>
               <a:pPr/>
-              <a:t>Wednesday, May 18, 2016</a:t>
+              <a:t>Friday, May 20, 2016</a:t>
             </a:fld>
             <a:endParaRPr lang="en-US"/>
           </a:p>
@@ -1392,7 +1393,7 @@
     <a:masterClrMapping/>
   </p:clrMapOvr>
   <mc:AlternateContent xmlns:mc="http://schemas.openxmlformats.org/markup-compatibility/2006">
-    <mc:Choice xmlns="" xmlns:p14="http://schemas.microsoft.com/office/powerpoint/2010/main" Requires="p14">
+    <mc:Choice xmlns:p14="http://schemas.microsoft.com/office/powerpoint/2010/main" xmlns="" Requires="p14">
       <p:transition p14:dur="100">
         <p:cut/>
       </p:transition>
@@ -1530,7 +1531,7 @@
             <a:fld id="{D8D89BD2-8F64-7D49-B0EC-A10964D418B9}" type="datetime2">
               <a:rPr lang="en-US" smtClean="0"/>
               <a:pPr/>
-              <a:t>Wednesday, May 18, 2016</a:t>
+              <a:t>Friday, May 20, 2016</a:t>
             </a:fld>
             <a:endParaRPr lang="en-US"/>
           </a:p>
@@ -1597,7 +1598,7 @@
     <a:masterClrMapping/>
   </p:clrMapOvr>
   <mc:AlternateContent xmlns:mc="http://schemas.openxmlformats.org/markup-compatibility/2006">
-    <mc:Choice xmlns="" xmlns:p14="http://schemas.microsoft.com/office/powerpoint/2010/main" Requires="p14">
+    <mc:Choice xmlns:p14="http://schemas.microsoft.com/office/powerpoint/2010/main" xmlns="" Requires="p14">
       <p:transition p14:dur="100">
         <p:cut/>
       </p:transition>
@@ -1801,7 +1802,7 @@
             <a:fld id="{5166F277-A6C8-D74E-AD9A-DEDC5E2BD837}" type="datetime2">
               <a:rPr lang="en-US" smtClean="0"/>
               <a:pPr/>
-              <a:t>Wednesday, May 18, 2016</a:t>
+              <a:t>Friday, May 20, 2016</a:t>
             </a:fld>
             <a:endParaRPr lang="en-US"/>
           </a:p>
@@ -1868,7 +1869,7 @@
     <a:masterClrMapping/>
   </p:clrMapOvr>
   <mc:AlternateContent xmlns:mc="http://schemas.openxmlformats.org/markup-compatibility/2006">
-    <mc:Choice xmlns="" xmlns:p14="http://schemas.microsoft.com/office/powerpoint/2010/main" Requires="p14">
+    <mc:Choice xmlns:p14="http://schemas.microsoft.com/office/powerpoint/2010/main" xmlns="" Requires="p14">
       <p:transition p14:dur="100">
         <p:cut/>
       </p:transition>
@@ -2119,7 +2120,7 @@
             <a:fld id="{68B6B04E-5C92-7445-BA45-A4E3769C0C5A}" type="datetime2">
               <a:rPr lang="en-US" smtClean="0"/>
               <a:pPr/>
-              <a:t>Wednesday, May 18, 2016</a:t>
+              <a:t>Friday, May 20, 2016</a:t>
             </a:fld>
             <a:endParaRPr lang="en-US"/>
           </a:p>
@@ -2186,7 +2187,7 @@
     <a:masterClrMapping/>
   </p:clrMapOvr>
   <mc:AlternateContent xmlns:mc="http://schemas.openxmlformats.org/markup-compatibility/2006">
-    <mc:Choice xmlns="" xmlns:p14="http://schemas.microsoft.com/office/powerpoint/2010/main" Requires="p14">
+    <mc:Choice xmlns:p14="http://schemas.microsoft.com/office/powerpoint/2010/main" xmlns="" Requires="p14">
       <p:transition p14:dur="100">
         <p:cut/>
       </p:transition>
@@ -2571,7 +2572,7 @@
             <a:fld id="{A48670BD-E6C9-264B-B690-760DD144ACC6}" type="datetime2">
               <a:rPr lang="en-US" smtClean="0"/>
               <a:pPr/>
-              <a:t>Wednesday, May 18, 2016</a:t>
+              <a:t>Friday, May 20, 2016</a:t>
             </a:fld>
             <a:endParaRPr lang="en-US"/>
           </a:p>
@@ -2638,7 +2639,7 @@
     <a:masterClrMapping/>
   </p:clrMapOvr>
   <mc:AlternateContent xmlns:mc="http://schemas.openxmlformats.org/markup-compatibility/2006">
-    <mc:Choice xmlns="" xmlns:p14="http://schemas.microsoft.com/office/powerpoint/2010/main" Requires="p14">
+    <mc:Choice xmlns:p14="http://schemas.microsoft.com/office/powerpoint/2010/main" xmlns="" Requires="p14">
       <p:transition p14:dur="100">
         <p:cut/>
       </p:transition>
@@ -2719,7 +2720,7 @@
             <a:fld id="{30675A36-41C1-3640-8C6B-1BC6AFC60484}" type="datetime2">
               <a:rPr lang="en-US" smtClean="0"/>
               <a:pPr/>
-              <a:t>Wednesday, May 18, 2016</a:t>
+              <a:t>Friday, May 20, 2016</a:t>
             </a:fld>
             <a:endParaRPr lang="en-US"/>
           </a:p>
@@ -2786,7 +2787,7 @@
     <a:masterClrMapping/>
   </p:clrMapOvr>
   <mc:AlternateContent xmlns:mc="http://schemas.openxmlformats.org/markup-compatibility/2006">
-    <mc:Choice xmlns="" xmlns:p14="http://schemas.microsoft.com/office/powerpoint/2010/main" Requires="p14">
+    <mc:Choice xmlns:p14="http://schemas.microsoft.com/office/powerpoint/2010/main" xmlns="" Requires="p14">
       <p:transition p14:dur="100">
         <p:cut/>
       </p:transition>
@@ -2839,7 +2840,7 @@
             <a:fld id="{937F365B-D897-1947-952A-6C45D93ACDC1}" type="datetime2">
               <a:rPr lang="en-US" smtClean="0"/>
               <a:pPr/>
-              <a:t>Wednesday, May 18, 2016</a:t>
+              <a:t>Friday, May 20, 2016</a:t>
             </a:fld>
             <a:endParaRPr lang="en-US"/>
           </a:p>
@@ -2906,7 +2907,7 @@
     <a:masterClrMapping/>
   </p:clrMapOvr>
   <mc:AlternateContent xmlns:mc="http://schemas.openxmlformats.org/markup-compatibility/2006">
-    <mc:Choice xmlns="" xmlns:p14="http://schemas.microsoft.com/office/powerpoint/2010/main" Requires="p14">
+    <mc:Choice xmlns:p14="http://schemas.microsoft.com/office/powerpoint/2010/main" xmlns="" Requires="p14">
       <p:transition p14:dur="100">
         <p:cut/>
       </p:transition>
@@ -3141,7 +3142,7 @@
             <a:fld id="{2BEF7792-C4C4-FC44-A7F5-725EC2CD30B1}" type="datetime2">
               <a:rPr lang="en-US" smtClean="0"/>
               <a:pPr/>
-              <a:t>Wednesday, May 18, 2016</a:t>
+              <a:t>Friday, May 20, 2016</a:t>
             </a:fld>
             <a:endParaRPr lang="en-US"/>
           </a:p>
@@ -3208,7 +3209,7 @@
     <a:masterClrMapping/>
   </p:clrMapOvr>
   <mc:AlternateContent xmlns:mc="http://schemas.openxmlformats.org/markup-compatibility/2006">
-    <mc:Choice xmlns="" xmlns:p14="http://schemas.microsoft.com/office/powerpoint/2010/main" Requires="p14">
+    <mc:Choice xmlns:p14="http://schemas.microsoft.com/office/powerpoint/2010/main" xmlns="" Requires="p14">
       <p:transition p14:dur="100">
         <p:cut/>
       </p:transition>
@@ -3426,7 +3427,7 @@
             <a:fld id="{EC13829E-7EE3-3944-BE84-808F00A9FAF3}" type="datetime2">
               <a:rPr lang="en-US" smtClean="0"/>
               <a:pPr/>
-              <a:t>Wednesday, May 18, 2016</a:t>
+              <a:t>Friday, May 20, 2016</a:t>
             </a:fld>
             <a:endParaRPr lang="en-US"/>
           </a:p>
@@ -3493,7 +3494,7 @@
     <a:masterClrMapping/>
   </p:clrMapOvr>
   <mc:AlternateContent xmlns:mc="http://schemas.openxmlformats.org/markup-compatibility/2006">
-    <mc:Choice xmlns="" xmlns:p14="http://schemas.microsoft.com/office/powerpoint/2010/main" Requires="p14">
+    <mc:Choice xmlns:p14="http://schemas.microsoft.com/office/powerpoint/2010/main" xmlns="" Requires="p14">
       <p:transition p14:dur="100">
         <p:cut/>
       </p:transition>
@@ -3692,7 +3693,7 @@
             <a:fld id="{92714F1E-B45D-F141-BCEC-0A4A490D9DB7}" type="datetime2">
               <a:rPr lang="en-US" smtClean="0"/>
               <a:pPr/>
-              <a:t>Wednesday, May 18, 2016</a:t>
+              <a:t>Friday, May 20, 2016</a:t>
             </a:fld>
             <a:endParaRPr lang="en-US" dirty="0"/>
           </a:p>
@@ -3814,7 +3815,7 @@
     <p:sldLayoutId id="2147485506" r:id="rId11"/>
   </p:sldLayoutIdLst>
   <mc:AlternateContent xmlns:mc="http://schemas.openxmlformats.org/markup-compatibility/2006">
-    <mc:Choice xmlns="" xmlns:p14="http://schemas.microsoft.com/office/powerpoint/2010/main" Requires="p14">
+    <mc:Choice xmlns:p14="http://schemas.microsoft.com/office/powerpoint/2010/main" xmlns="" Requires="p14">
       <p:transition p14:dur="100">
         <p:cut/>
       </p:transition>
@@ -4249,8 +4250,9 @@
           <a:p>
             <a:r>
               <a:rPr lang="en-US" sz="5400" dirty="0" smtClean="0"/>
-              <a:t>Yeoman, Grunt (Gulp)</a:t>
-            </a:r>
+              <a:t>Yeoman</a:t>
+            </a:r>
+            <a:endParaRPr lang="en-US" sz="5400" dirty="0" smtClean="0"/>
           </a:p>
         </p:txBody>
       </p:sp>
@@ -4433,7 +4435,15 @@
                   <a:srgbClr val="0E5EA5"/>
                 </a:solidFill>
               </a:rPr>
-              <a:t>:</a:t>
+              <a:t>: </a:t>
+            </a:r>
+            <a:r>
+              <a:rPr lang="en-US" sz="2000" b="1" i="1" dirty="0" err="1" smtClean="0">
+                <a:solidFill>
+                  <a:srgbClr val="0E5EA5"/>
+                </a:solidFill>
+              </a:rPr>
+              <a:t>SonVQ</a:t>
             </a:r>
             <a:endParaRPr lang="en-US" sz="2000" b="1" i="1" dirty="0">
               <a:solidFill>
@@ -4453,7 +4463,7 @@
         </p:nvSpPr>
         <p:spPr bwMode="auto">
           <a:xfrm>
-            <a:off x="631366" y="1962010"/>
+            <a:off x="631366" y="1929352"/>
             <a:ext cx="7772400" cy="1470025"/>
           </a:xfrm>
           <a:prstGeom prst="rect">
@@ -4534,7 +4544,7 @@
     </p:spTree>
     <p:extLst>
       <p:ext uri="{BB962C8B-B14F-4D97-AF65-F5344CB8AC3E}">
-        <p14:creationId xmlns="" xmlns:p14="http://schemas.microsoft.com/office/powerpoint/2010/main" val="1516866467"/>
+        <p14:creationId xmlns:p14="http://schemas.microsoft.com/office/powerpoint/2010/main" xmlns="" val="1516866467"/>
       </p:ext>
     </p:extLst>
   </p:cSld>
@@ -4542,7 +4552,7 @@
     <a:overrideClrMapping bg1="lt1" tx1="dk1" bg2="lt2" tx2="dk2" accent1="accent1" accent2="accent2" accent3="accent3" accent4="accent4" accent5="accent5" accent6="accent6" hlink="hlink" folHlink="folHlink"/>
   </p:clrMapOvr>
   <mc:AlternateContent xmlns:mc="http://schemas.openxmlformats.org/markup-compatibility/2006">
-    <mc:Choice xmlns="" xmlns:p14="http://schemas.microsoft.com/office/powerpoint/2010/main" Requires="p14">
+    <mc:Choice xmlns:p14="http://schemas.microsoft.com/office/powerpoint/2010/main" xmlns="" Requires="p14">
       <p:transition p14:dur="100">
         <p:cut/>
       </p:transition>
@@ -4590,143 +4600,106 @@
             <p:ph type="title"/>
           </p:nvPr>
         </p:nvSpPr>
-        <p:spPr/>
+        <p:spPr>
+          <a:xfrm>
+            <a:off x="457199" y="664029"/>
+            <a:ext cx="8229600" cy="739014"/>
+          </a:xfrm>
+        </p:spPr>
         <p:txBody>
           <a:bodyPr/>
           <a:lstStyle/>
           <a:p>
             <a:r>
-              <a:rPr lang="en-US" smtClean="0"/>
-              <a:t>OUTLINE</a:t>
-            </a:r>
-            <a:endParaRPr lang="en-US"/>
-          </a:p>
-        </p:txBody>
-      </p:sp>
-      <p:sp>
-        <p:nvSpPr>
-          <p:cNvPr id="3" name="Content Placeholder 2"/>
-          <p:cNvSpPr>
-            <a:spLocks noGrp="1"/>
-          </p:cNvSpPr>
-          <p:nvPr>
-            <p:ph idx="1"/>
-          </p:nvPr>
-        </p:nvSpPr>
-        <p:spPr>
+              <a:rPr lang="en-US" dirty="0" smtClean="0"/>
+              <a:t>What is Yeoman</a:t>
+            </a:r>
+            <a:endParaRPr lang="en-US" dirty="0"/>
+          </a:p>
+        </p:txBody>
+      </p:sp>
+      <p:pic>
+        <p:nvPicPr>
+          <p:cNvPr id="1026" name="Picture 2" descr="C:\Users\sonvq\Desktop\illustration-home-inverted.91b07808be.png"/>
+          <p:cNvPicPr>
+            <a:picLocks noChangeAspect="1" noChangeArrowheads="1"/>
+          </p:cNvPicPr>
+          <p:nvPr/>
+        </p:nvPicPr>
+        <p:blipFill>
+          <a:blip r:embed="rId2"/>
+          <a:srcRect/>
+          <a:stretch>
+            <a:fillRect/>
+          </a:stretch>
+        </p:blipFill>
+        <p:spPr bwMode="auto">
           <a:xfrm>
-            <a:off x="457199" y="2273304"/>
-            <a:ext cx="3788229" cy="4157663"/>
-          </a:xfrm>
-        </p:spPr>
-        <p:txBody>
-          <a:bodyPr/>
-          <a:lstStyle/>
-          <a:p>
-            <a:r>
-              <a:rPr lang="en-US" sz="2800" smtClean="0"/>
-              <a:t>What is AngularJS</a:t>
-            </a:r>
-          </a:p>
-          <a:p>
-            <a:r>
-              <a:rPr lang="en-US" sz="2800" smtClean="0"/>
-              <a:t>Why use AngularJS</a:t>
-            </a:r>
-          </a:p>
-          <a:p>
-            <a:r>
-              <a:rPr lang="en-US" sz="2800" smtClean="0"/>
-              <a:t>Core Features</a:t>
-            </a:r>
-          </a:p>
-          <a:p>
-            <a:r>
-              <a:rPr lang="en-US" sz="2800" smtClean="0"/>
-              <a:t>Two-way data binding</a:t>
-            </a:r>
-          </a:p>
-          <a:p>
-            <a:r>
-              <a:rPr lang="en-US" sz="2800" smtClean="0"/>
-              <a:t>Modules</a:t>
-            </a:r>
-          </a:p>
-          <a:p>
-            <a:endParaRPr lang="en-US" sz="2800" smtClean="0"/>
-          </a:p>
-        </p:txBody>
-      </p:sp>
-      <p:sp>
-        <p:nvSpPr>
-          <p:cNvPr id="4" name="Rectangle 3"/>
-          <p:cNvSpPr/>
-          <p:nvPr/>
-        </p:nvSpPr>
-        <p:spPr>
-          <a:xfrm>
-            <a:off x="4898571" y="2229760"/>
-            <a:ext cx="4572000" cy="2554545"/>
+            <a:off x="4662196" y="4245431"/>
+            <a:ext cx="4470918" cy="2503714"/>
           </a:xfrm>
           <a:prstGeom prst="rect">
             <a:avLst/>
           </a:prstGeom>
+          <a:noFill/>
         </p:spPr>
-        <p:txBody>
-          <a:bodyPr>
-            <a:spAutoFit/>
-          </a:bodyPr>
+      </p:pic>
+      <p:sp>
+        <p:nvSpPr>
+          <p:cNvPr id="7" name="Content Placeholder 6"/>
+          <p:cNvSpPr>
+            <a:spLocks noGrp="1"/>
+          </p:cNvSpPr>
+          <p:nvPr>
+            <p:ph idx="1"/>
+          </p:nvPr>
+        </p:nvSpPr>
+        <p:spPr>
+          <a:xfrm>
+            <a:off x="547396" y="1850571"/>
+            <a:ext cx="8229600" cy="4157663"/>
+          </a:xfrm>
+        </p:spPr>
+        <p:txBody>
+          <a:bodyPr/>
           <a:lstStyle/>
           <a:p>
-            <a:pPr marL="514350" indent="-514350">
-              <a:buFont typeface="Arial" pitchFamily="34" charset="0"/>
-              <a:buChar char="•"/>
-            </a:pPr>
-            <a:r>
-              <a:rPr lang="en-US" sz="3200" smtClean="0"/>
-              <a:t>Controllers</a:t>
-            </a:r>
-          </a:p>
-          <a:p>
-            <a:pPr marL="514350" indent="-514350">
-              <a:buFont typeface="Arial" pitchFamily="34" charset="0"/>
-              <a:buChar char="•"/>
-            </a:pPr>
-            <a:r>
-              <a:rPr lang="en-US" sz="3200" smtClean="0"/>
-              <a:t>Directive</a:t>
-            </a:r>
-          </a:p>
-          <a:p>
-            <a:pPr marL="514350" indent="-514350">
-              <a:buFont typeface="Arial" pitchFamily="34" charset="0"/>
-              <a:buChar char="•"/>
-            </a:pPr>
-            <a:r>
-              <a:rPr lang="en-US" sz="3200" smtClean="0"/>
-              <a:t>Expresstion</a:t>
-            </a:r>
-          </a:p>
-          <a:p>
-            <a:pPr marL="514350" indent="-514350">
-              <a:buFont typeface="Arial" pitchFamily="34" charset="0"/>
-              <a:buChar char="•"/>
-            </a:pPr>
-            <a:r>
-              <a:rPr lang="en-US" sz="3200" smtClean="0"/>
-              <a:t>DI</a:t>
-            </a:r>
-          </a:p>
-          <a:p>
-            <a:pPr marL="514350" indent="-514350">
-              <a:buFont typeface="Arial" pitchFamily="34" charset="0"/>
-              <a:buChar char="•"/>
-            </a:pPr>
-            <a:r>
-              <a:rPr lang="en-US" sz="3200" smtClean="0"/>
-              <a:t>Topics</a:t>
-            </a:r>
-            <a:endParaRPr lang="en-US" sz="3200"/>
+            <a:r>
+              <a:rPr lang="en-US" dirty="0" smtClean="0"/>
+              <a:t>The web's scaffolding tool for modern </a:t>
+            </a:r>
+            <a:r>
+              <a:rPr lang="en-US" dirty="0" err="1" smtClean="0"/>
+              <a:t>webapps</a:t>
+            </a:r>
+            <a:endParaRPr lang="en-US" dirty="0" smtClean="0"/>
+          </a:p>
+          <a:p>
+            <a:r>
+              <a:rPr lang="en-US" dirty="0" smtClean="0"/>
+              <a:t>Help to </a:t>
+            </a:r>
+            <a:r>
+              <a:rPr lang="en-US" dirty="0" err="1" smtClean="0"/>
+              <a:t>kickstart</a:t>
+            </a:r>
+            <a:r>
+              <a:rPr lang="en-US" dirty="0" smtClean="0"/>
+              <a:t> new projects</a:t>
+            </a:r>
+            <a:r>
+              <a:rPr lang="en-US" smtClean="0"/>
+              <a:t>, </a:t>
+            </a:r>
+            <a:r>
+              <a:rPr lang="en-US" smtClean="0"/>
+              <a:t>provide best </a:t>
+            </a:r>
+            <a:r>
+              <a:rPr lang="en-US" dirty="0" smtClean="0"/>
+              <a:t>practices and tools to help you stay productive</a:t>
+            </a:r>
+            <a:endParaRPr lang="en-US" dirty="0"/>
           </a:p>
         </p:txBody>
       </p:sp>
@@ -4736,7 +4709,7 @@
     <a:masterClrMapping/>
   </p:clrMapOvr>
   <mc:AlternateContent xmlns:mc="http://schemas.openxmlformats.org/markup-compatibility/2006">
-    <mc:Choice xmlns="" xmlns:p14="http://schemas.microsoft.com/office/powerpoint/2010/main" Requires="p14">
+    <mc:Choice xmlns:p14="http://schemas.microsoft.com/office/powerpoint/2010/main" xmlns="" Requires="p14">
       <p:transition p14:dur="100">
         <p:cut/>
       </p:transition>
@@ -4781,6 +4754,210 @@
             <a:spLocks noGrp="1"/>
           </p:cNvSpPr>
           <p:nvPr>
+            <p:ph type="title"/>
+          </p:nvPr>
+        </p:nvSpPr>
+        <p:spPr/>
+        <p:txBody>
+          <a:bodyPr/>
+          <a:lstStyle/>
+          <a:p>
+            <a:r>
+              <a:rPr lang="en-US" smtClean="0"/>
+              <a:t>OUTLINE</a:t>
+            </a:r>
+            <a:endParaRPr lang="en-US"/>
+          </a:p>
+        </p:txBody>
+      </p:sp>
+      <p:sp>
+        <p:nvSpPr>
+          <p:cNvPr id="3" name="Content Placeholder 2"/>
+          <p:cNvSpPr>
+            <a:spLocks noGrp="1"/>
+          </p:cNvSpPr>
+          <p:nvPr>
+            <p:ph idx="1"/>
+          </p:nvPr>
+        </p:nvSpPr>
+        <p:spPr>
+          <a:xfrm>
+            <a:off x="457199" y="2273304"/>
+            <a:ext cx="3788229" cy="4157663"/>
+          </a:xfrm>
+        </p:spPr>
+        <p:txBody>
+          <a:bodyPr/>
+          <a:lstStyle/>
+          <a:p>
+            <a:r>
+              <a:rPr lang="en-US" sz="2800" dirty="0" smtClean="0"/>
+              <a:t>What is </a:t>
+            </a:r>
+            <a:r>
+              <a:rPr lang="en-US" sz="2800" dirty="0" err="1" smtClean="0"/>
+              <a:t>AngularJS</a:t>
+            </a:r>
+            <a:endParaRPr lang="en-US" sz="2800" dirty="0" smtClean="0"/>
+          </a:p>
+          <a:p>
+            <a:r>
+              <a:rPr lang="en-US" sz="2800" dirty="0" smtClean="0"/>
+              <a:t>Why use </a:t>
+            </a:r>
+            <a:r>
+              <a:rPr lang="en-US" sz="2800" dirty="0" err="1" smtClean="0"/>
+              <a:t>AngularJS</a:t>
+            </a:r>
+            <a:endParaRPr lang="en-US" sz="2800" dirty="0" smtClean="0"/>
+          </a:p>
+          <a:p>
+            <a:r>
+              <a:rPr lang="en-US" sz="2800" dirty="0" smtClean="0"/>
+              <a:t>Core Features</a:t>
+            </a:r>
+          </a:p>
+          <a:p>
+            <a:r>
+              <a:rPr lang="en-US" sz="2800" dirty="0" smtClean="0"/>
+              <a:t>Two-way data binding</a:t>
+            </a:r>
+          </a:p>
+          <a:p>
+            <a:r>
+              <a:rPr lang="en-US" sz="2800" dirty="0" smtClean="0"/>
+              <a:t>Modules</a:t>
+            </a:r>
+          </a:p>
+          <a:p>
+            <a:endParaRPr lang="en-US" sz="2800" dirty="0" smtClean="0"/>
+          </a:p>
+        </p:txBody>
+      </p:sp>
+      <p:sp>
+        <p:nvSpPr>
+          <p:cNvPr id="4" name="Rectangle 3"/>
+          <p:cNvSpPr/>
+          <p:nvPr/>
+        </p:nvSpPr>
+        <p:spPr>
+          <a:xfrm>
+            <a:off x="4898571" y="2229760"/>
+            <a:ext cx="4572000" cy="2554545"/>
+          </a:xfrm>
+          <a:prstGeom prst="rect">
+            <a:avLst/>
+          </a:prstGeom>
+        </p:spPr>
+        <p:txBody>
+          <a:bodyPr>
+            <a:spAutoFit/>
+          </a:bodyPr>
+          <a:lstStyle/>
+          <a:p>
+            <a:pPr marL="514350" indent="-514350">
+              <a:buFont typeface="Arial" pitchFamily="34" charset="0"/>
+              <a:buChar char="•"/>
+            </a:pPr>
+            <a:r>
+              <a:rPr lang="en-US" sz="3200" smtClean="0"/>
+              <a:t>Controllers</a:t>
+            </a:r>
+          </a:p>
+          <a:p>
+            <a:pPr marL="514350" indent="-514350">
+              <a:buFont typeface="Arial" pitchFamily="34" charset="0"/>
+              <a:buChar char="•"/>
+            </a:pPr>
+            <a:r>
+              <a:rPr lang="en-US" sz="3200" smtClean="0"/>
+              <a:t>Directive</a:t>
+            </a:r>
+          </a:p>
+          <a:p>
+            <a:pPr marL="514350" indent="-514350">
+              <a:buFont typeface="Arial" pitchFamily="34" charset="0"/>
+              <a:buChar char="•"/>
+            </a:pPr>
+            <a:r>
+              <a:rPr lang="en-US" sz="3200" smtClean="0"/>
+              <a:t>Expresstion</a:t>
+            </a:r>
+          </a:p>
+          <a:p>
+            <a:pPr marL="514350" indent="-514350">
+              <a:buFont typeface="Arial" pitchFamily="34" charset="0"/>
+              <a:buChar char="•"/>
+            </a:pPr>
+            <a:r>
+              <a:rPr lang="en-US" sz="3200" smtClean="0"/>
+              <a:t>DI</a:t>
+            </a:r>
+          </a:p>
+          <a:p>
+            <a:pPr marL="514350" indent="-514350">
+              <a:buFont typeface="Arial" pitchFamily="34" charset="0"/>
+              <a:buChar char="•"/>
+            </a:pPr>
+            <a:r>
+              <a:rPr lang="en-US" sz="3200" smtClean="0"/>
+              <a:t>Topics</a:t>
+            </a:r>
+            <a:endParaRPr lang="en-US" sz="3200"/>
+          </a:p>
+        </p:txBody>
+      </p:sp>
+    </p:spTree>
+  </p:cSld>
+  <p:clrMapOvr>
+    <a:masterClrMapping/>
+  </p:clrMapOvr>
+  <mc:AlternateContent xmlns:mc="http://schemas.openxmlformats.org/markup-compatibility/2006">
+    <mc:Choice xmlns:p14="http://schemas.microsoft.com/office/powerpoint/2010/main" xmlns="" Requires="p14">
+      <p:transition p14:dur="100">
+        <p:cut/>
+      </p:transition>
+    </mc:Choice>
+    <mc:Fallback>
+      <p:transition>
+        <p:cut/>
+      </p:transition>
+    </mc:Fallback>
+  </mc:AlternateContent>
+  <p:timing>
+    <p:tnLst>
+      <p:par>
+        <p:cTn id="1" dur="indefinite" restart="never" nodeType="tmRoot"/>
+      </p:par>
+    </p:tnLst>
+  </p:timing>
+</p:sld>
+</file>
+
+<file path=ppt/slides/slide4.xml><?xml version="1.0" encoding="utf-8"?>
+<p:sld xmlns:a="http://schemas.openxmlformats.org/drawingml/2006/main" xmlns:r="http://schemas.openxmlformats.org/officeDocument/2006/relationships" xmlns:p="http://schemas.openxmlformats.org/presentationml/2006/main">
+  <p:cSld>
+    <p:spTree>
+      <p:nvGrpSpPr>
+        <p:cNvPr id="1" name=""/>
+        <p:cNvGrpSpPr/>
+        <p:nvPr/>
+      </p:nvGrpSpPr>
+      <p:grpSpPr>
+        <a:xfrm>
+          <a:off x="0" y="0"/>
+          <a:ext cx="0" cy="0"/>
+          <a:chOff x="0" y="0"/>
+          <a:chExt cx="0" cy="0"/>
+        </a:xfrm>
+      </p:grpSpPr>
+      <p:sp>
+        <p:nvSpPr>
+          <p:cNvPr id="2" name="Title 1"/>
+          <p:cNvSpPr>
+            <a:spLocks noGrp="1"/>
+          </p:cNvSpPr>
+          <p:nvPr>
             <p:ph type="ctrTitle"/>
           </p:nvPr>
         </p:nvSpPr>
@@ -4838,7 +5015,7 @@
     </p:spTree>
     <p:extLst>
       <p:ext uri="{BB962C8B-B14F-4D97-AF65-F5344CB8AC3E}">
-        <p14:creationId xmlns="" xmlns:p14="http://schemas.microsoft.com/office/powerpoint/2010/main" val="3137979333"/>
+        <p14:creationId xmlns:p14="http://schemas.microsoft.com/office/powerpoint/2010/main" xmlns="" val="3137979333"/>
       </p:ext>
     </p:extLst>
   </p:cSld>
@@ -4846,7 +5023,7 @@
     <a:masterClrMapping/>
   </p:clrMapOvr>
   <mc:AlternateContent xmlns:mc="http://schemas.openxmlformats.org/markup-compatibility/2006">
-    <mc:Choice xmlns="" xmlns:p14="http://schemas.microsoft.com/office/powerpoint/2010/main" Requires="p14">
+    <mc:Choice xmlns:p14="http://schemas.microsoft.com/office/powerpoint/2010/main" xmlns="" Requires="p14">
       <p:transition p14:dur="100">
         <p:cut/>
       </p:transition>

</xml_diff>

<commit_message>
commit base source code
</commit_message>
<xml_diff>
--- a/QS_Training_AngularJS_Yeoman, Grunt, Gulp - SonVQ.pptx
+++ b/QS_Training_AngularJS_Yeoman, Grunt, Gulp - SonVQ.pptx
@@ -5,16 +5,17 @@
     <p:sldMasterId id="2147485495" r:id="rId1"/>
   </p:sldMasterIdLst>
   <p:notesMasterIdLst>
-    <p:notesMasterId r:id="rId6"/>
+    <p:notesMasterId r:id="rId7"/>
   </p:notesMasterIdLst>
   <p:handoutMasterIdLst>
-    <p:handoutMasterId r:id="rId7"/>
+    <p:handoutMasterId r:id="rId8"/>
   </p:handoutMasterIdLst>
   <p:sldIdLst>
     <p:sldId id="256" r:id="rId2"/>
     <p:sldId id="394" r:id="rId3"/>
-    <p:sldId id="393" r:id="rId4"/>
-    <p:sldId id="333" r:id="rId5"/>
+    <p:sldId id="395" r:id="rId4"/>
+    <p:sldId id="396" r:id="rId5"/>
+    <p:sldId id="333" r:id="rId6"/>
   </p:sldIdLst>
   <p:sldSz cx="9144000" cy="6858000" type="screen4x3"/>
   <p:notesSz cx="6858000" cy="9144000"/>
@@ -115,7 +116,7 @@
   </p:defaultTextStyle>
   <p:extLst>
     <p:ext uri="{EFAFB233-063F-42B5-8137-9DF3F51BA10A}">
-      <p15:sldGuideLst xmlns:p15="http://schemas.microsoft.com/office/powerpoint/2012/main" xmlns="">
+      <p15:sldGuideLst xmlns="" xmlns:p15="http://schemas.microsoft.com/office/powerpoint/2012/main">
         <p15:guide id="1" orient="horz" pos="2160">
           <p15:clr>
             <a:srgbClr val="A4A3A4"/>
@@ -215,7 +216,7 @@
             <a:fld id="{AEC239D8-9946-CA43-8D24-8F75F9EC746F}" type="datetimeFigureOut">
               <a:rPr lang="en-US" smtClean="0"/>
               <a:pPr/>
-              <a:t>5/20/2016</a:t>
+              <a:t>5/21/2016</a:t>
             </a:fld>
             <a:endParaRPr lang="en-US"/>
           </a:p>
@@ -291,7 +292,7 @@
     </p:spTree>
     <p:extLst>
       <p:ext uri="{BB962C8B-B14F-4D97-AF65-F5344CB8AC3E}">
-        <p14:creationId xmlns:p14="http://schemas.microsoft.com/office/powerpoint/2010/main" xmlns="" val="3557071831"/>
+        <p14:creationId xmlns="" xmlns:p14="http://schemas.microsoft.com/office/powerpoint/2010/main" val="3557071831"/>
       </p:ext>
     </p:extLst>
   </p:cSld>
@@ -383,7 +384,7 @@
             <a:fld id="{30D3C4F2-547F-4EAC-A4FB-1991884D518B}" type="datetimeFigureOut">
               <a:rPr lang="en-US" smtClean="0"/>
               <a:pPr/>
-              <a:t>5/20/2016</a:t>
+              <a:t>5/21/2016</a:t>
             </a:fld>
             <a:endParaRPr lang="en-US"/>
           </a:p>
@@ -554,7 +555,7 @@
     </p:spTree>
     <p:extLst>
       <p:ext uri="{BB962C8B-B14F-4D97-AF65-F5344CB8AC3E}">
-        <p14:creationId xmlns:p14="http://schemas.microsoft.com/office/powerpoint/2010/main" xmlns="" val="967518016"/>
+        <p14:creationId xmlns="" xmlns:p14="http://schemas.microsoft.com/office/powerpoint/2010/main" val="967518016"/>
       </p:ext>
     </p:extLst>
   </p:cSld>
@@ -730,9 +731,387 @@
     </p:spTree>
     <p:extLst>
       <p:ext uri="{BB962C8B-B14F-4D97-AF65-F5344CB8AC3E}">
-        <p14:creationId xmlns:p14="http://schemas.microsoft.com/office/powerpoint/2010/main" xmlns="" val="1083453538"/>
+        <p14:creationId xmlns="" xmlns:p14="http://schemas.microsoft.com/office/powerpoint/2010/main" val="1083453538"/>
       </p:ext>
     </p:extLst>
+  </p:cSld>
+  <p:clrMapOvr>
+    <a:masterClrMapping/>
+  </p:clrMapOvr>
+</p:notes>
+</file>
+
+<file path=ppt/notesSlides/notesSlide2.xml><?xml version="1.0" encoding="utf-8"?>
+<p:notes xmlns:a="http://schemas.openxmlformats.org/drawingml/2006/main" xmlns:r="http://schemas.openxmlformats.org/officeDocument/2006/relationships" xmlns:p="http://schemas.openxmlformats.org/presentationml/2006/main">
+  <p:cSld>
+    <p:spTree>
+      <p:nvGrpSpPr>
+        <p:cNvPr id="1" name=""/>
+        <p:cNvGrpSpPr/>
+        <p:nvPr/>
+      </p:nvGrpSpPr>
+      <p:grpSpPr>
+        <a:xfrm>
+          <a:off x="0" y="0"/>
+          <a:ext cx="0" cy="0"/>
+          <a:chOff x="0" y="0"/>
+          <a:chExt cx="0" cy="0"/>
+        </a:xfrm>
+      </p:grpSpPr>
+      <p:sp>
+        <p:nvSpPr>
+          <p:cNvPr id="2" name="Slide Image Placeholder 1"/>
+          <p:cNvSpPr>
+            <a:spLocks noGrp="1" noRot="1" noChangeAspect="1"/>
+          </p:cNvSpPr>
+          <p:nvPr>
+            <p:ph type="sldImg"/>
+          </p:nvPr>
+        </p:nvSpPr>
+        <p:spPr/>
+      </p:sp>
+      <p:sp>
+        <p:nvSpPr>
+          <p:cNvPr id="3" name="Notes Placeholder 2"/>
+          <p:cNvSpPr>
+            <a:spLocks noGrp="1"/>
+          </p:cNvSpPr>
+          <p:nvPr>
+            <p:ph type="body" idx="1"/>
+          </p:nvPr>
+        </p:nvSpPr>
+        <p:spPr/>
+        <p:txBody>
+          <a:bodyPr>
+            <a:normAutofit/>
+          </a:bodyPr>
+          <a:lstStyle/>
+          <a:p>
+            <a:r>
+              <a:rPr lang="en-US" sz="1200" b="0" i="0" kern="1200" dirty="0" err="1" smtClean="0">
+                <a:solidFill>
+                  <a:schemeClr val="tx1"/>
+                </a:solidFill>
+                <a:latin typeface="+mn-lt"/>
+                <a:ea typeface="+mn-ea"/>
+                <a:cs typeface="+mn-cs"/>
+              </a:rPr>
+              <a:t>Linting</a:t>
+            </a:r>
+            <a:r>
+              <a:rPr lang="en-US" sz="1200" b="0" i="0" kern="1200" dirty="0" smtClean="0">
+                <a:solidFill>
+                  <a:schemeClr val="tx1"/>
+                </a:solidFill>
+                <a:latin typeface="+mn-lt"/>
+                <a:ea typeface="+mn-ea"/>
+                <a:cs typeface="+mn-cs"/>
+              </a:rPr>
+              <a:t> is the process of running a program that will </a:t>
+            </a:r>
+            <a:r>
+              <a:rPr lang="en-US" sz="1200" b="0" i="0" kern="1200" dirty="0" err="1" smtClean="0">
+                <a:solidFill>
+                  <a:schemeClr val="tx1"/>
+                </a:solidFill>
+                <a:latin typeface="+mn-lt"/>
+                <a:ea typeface="+mn-ea"/>
+                <a:cs typeface="+mn-cs"/>
+              </a:rPr>
+              <a:t>analyse</a:t>
+            </a:r>
+            <a:r>
+              <a:rPr lang="en-US" sz="1200" b="0" i="0" kern="1200" dirty="0" smtClean="0">
+                <a:solidFill>
+                  <a:schemeClr val="tx1"/>
+                </a:solidFill>
+                <a:latin typeface="+mn-lt"/>
+                <a:ea typeface="+mn-ea"/>
+                <a:cs typeface="+mn-cs"/>
+              </a:rPr>
+              <a:t> code for potential errors.</a:t>
+            </a:r>
+            <a:endParaRPr lang="en-US" dirty="0"/>
+          </a:p>
+        </p:txBody>
+      </p:sp>
+      <p:sp>
+        <p:nvSpPr>
+          <p:cNvPr id="4" name="Slide Number Placeholder 3"/>
+          <p:cNvSpPr>
+            <a:spLocks noGrp="1"/>
+          </p:cNvSpPr>
+          <p:nvPr>
+            <p:ph type="sldNum" sz="quarter" idx="10"/>
+          </p:nvPr>
+        </p:nvSpPr>
+        <p:spPr/>
+        <p:txBody>
+          <a:bodyPr/>
+          <a:lstStyle/>
+          <a:p>
+            <a:fld id="{35845946-0CF3-4C0F-AF5C-F563F65A0652}" type="slidenum">
+              <a:rPr lang="en-US" smtClean="0"/>
+              <a:pPr/>
+              <a:t>2</a:t>
+            </a:fld>
+            <a:endParaRPr lang="en-US"/>
+          </a:p>
+        </p:txBody>
+      </p:sp>
+    </p:spTree>
+  </p:cSld>
+  <p:clrMapOvr>
+    <a:masterClrMapping/>
+  </p:clrMapOvr>
+</p:notes>
+</file>
+
+<file path=ppt/notesSlides/notesSlide3.xml><?xml version="1.0" encoding="utf-8"?>
+<p:notes xmlns:a="http://schemas.openxmlformats.org/drawingml/2006/main" xmlns:r="http://schemas.openxmlformats.org/officeDocument/2006/relationships" xmlns:p="http://schemas.openxmlformats.org/presentationml/2006/main">
+  <p:cSld>
+    <p:spTree>
+      <p:nvGrpSpPr>
+        <p:cNvPr id="1" name=""/>
+        <p:cNvGrpSpPr/>
+        <p:nvPr/>
+      </p:nvGrpSpPr>
+      <p:grpSpPr>
+        <a:xfrm>
+          <a:off x="0" y="0"/>
+          <a:ext cx="0" cy="0"/>
+          <a:chOff x="0" y="0"/>
+          <a:chExt cx="0" cy="0"/>
+        </a:xfrm>
+      </p:grpSpPr>
+      <p:sp>
+        <p:nvSpPr>
+          <p:cNvPr id="2" name="Slide Image Placeholder 1"/>
+          <p:cNvSpPr>
+            <a:spLocks noGrp="1" noRot="1" noChangeAspect="1"/>
+          </p:cNvSpPr>
+          <p:nvPr>
+            <p:ph type="sldImg"/>
+          </p:nvPr>
+        </p:nvSpPr>
+        <p:spPr/>
+      </p:sp>
+      <p:sp>
+        <p:nvSpPr>
+          <p:cNvPr id="3" name="Notes Placeholder 2"/>
+          <p:cNvSpPr>
+            <a:spLocks noGrp="1"/>
+          </p:cNvSpPr>
+          <p:nvPr>
+            <p:ph type="body" idx="1"/>
+          </p:nvPr>
+        </p:nvSpPr>
+        <p:spPr/>
+        <p:txBody>
+          <a:bodyPr>
+            <a:normAutofit/>
+          </a:bodyPr>
+          <a:lstStyle/>
+          <a:p>
+            <a:r>
+              <a:rPr lang="en-US" sz="1200" b="0" i="0" kern="1200" dirty="0" err="1" smtClean="0">
+                <a:solidFill>
+                  <a:schemeClr val="tx1"/>
+                </a:solidFill>
+                <a:latin typeface="+mn-lt"/>
+                <a:ea typeface="+mn-ea"/>
+                <a:cs typeface="+mn-cs"/>
+              </a:rPr>
+              <a:t>Linting</a:t>
+            </a:r>
+            <a:r>
+              <a:rPr lang="en-US" sz="1200" b="0" i="0" kern="1200" dirty="0" smtClean="0">
+                <a:solidFill>
+                  <a:schemeClr val="tx1"/>
+                </a:solidFill>
+                <a:latin typeface="+mn-lt"/>
+                <a:ea typeface="+mn-ea"/>
+                <a:cs typeface="+mn-cs"/>
+              </a:rPr>
+              <a:t> is the process of running a program that will </a:t>
+            </a:r>
+            <a:r>
+              <a:rPr lang="en-US" sz="1200" b="0" i="0" kern="1200" dirty="0" err="1" smtClean="0">
+                <a:solidFill>
+                  <a:schemeClr val="tx1"/>
+                </a:solidFill>
+                <a:latin typeface="+mn-lt"/>
+                <a:ea typeface="+mn-ea"/>
+                <a:cs typeface="+mn-cs"/>
+              </a:rPr>
+              <a:t>analyse</a:t>
+            </a:r>
+            <a:r>
+              <a:rPr lang="en-US" sz="1200" b="0" i="0" kern="1200" smtClean="0">
+                <a:solidFill>
+                  <a:schemeClr val="tx1"/>
+                </a:solidFill>
+                <a:latin typeface="+mn-lt"/>
+                <a:ea typeface="+mn-ea"/>
+                <a:cs typeface="+mn-cs"/>
+              </a:rPr>
+              <a:t> code for potential errors.</a:t>
+            </a:r>
+            <a:endParaRPr lang="en-US"/>
+          </a:p>
+        </p:txBody>
+      </p:sp>
+      <p:sp>
+        <p:nvSpPr>
+          <p:cNvPr id="4" name="Slide Number Placeholder 3"/>
+          <p:cNvSpPr>
+            <a:spLocks noGrp="1"/>
+          </p:cNvSpPr>
+          <p:nvPr>
+            <p:ph type="sldNum" sz="quarter" idx="10"/>
+          </p:nvPr>
+        </p:nvSpPr>
+        <p:spPr/>
+        <p:txBody>
+          <a:bodyPr/>
+          <a:lstStyle/>
+          <a:p>
+            <a:fld id="{35845946-0CF3-4C0F-AF5C-F563F65A0652}" type="slidenum">
+              <a:rPr lang="en-US" smtClean="0"/>
+              <a:pPr/>
+              <a:t>3</a:t>
+            </a:fld>
+            <a:endParaRPr lang="en-US"/>
+          </a:p>
+        </p:txBody>
+      </p:sp>
+    </p:spTree>
+  </p:cSld>
+  <p:clrMapOvr>
+    <a:masterClrMapping/>
+  </p:clrMapOvr>
+</p:notes>
+</file>
+
+<file path=ppt/notesSlides/notesSlide4.xml><?xml version="1.0" encoding="utf-8"?>
+<p:notes xmlns:a="http://schemas.openxmlformats.org/drawingml/2006/main" xmlns:r="http://schemas.openxmlformats.org/officeDocument/2006/relationships" xmlns:p="http://schemas.openxmlformats.org/presentationml/2006/main">
+  <p:cSld>
+    <p:spTree>
+      <p:nvGrpSpPr>
+        <p:cNvPr id="1" name=""/>
+        <p:cNvGrpSpPr/>
+        <p:nvPr/>
+      </p:nvGrpSpPr>
+      <p:grpSpPr>
+        <a:xfrm>
+          <a:off x="0" y="0"/>
+          <a:ext cx="0" cy="0"/>
+          <a:chOff x="0" y="0"/>
+          <a:chExt cx="0" cy="0"/>
+        </a:xfrm>
+      </p:grpSpPr>
+      <p:sp>
+        <p:nvSpPr>
+          <p:cNvPr id="2" name="Slide Image Placeholder 1"/>
+          <p:cNvSpPr>
+            <a:spLocks noGrp="1" noRot="1" noChangeAspect="1"/>
+          </p:cNvSpPr>
+          <p:nvPr>
+            <p:ph type="sldImg"/>
+          </p:nvPr>
+        </p:nvSpPr>
+        <p:spPr/>
+      </p:sp>
+      <p:sp>
+        <p:nvSpPr>
+          <p:cNvPr id="3" name="Notes Placeholder 2"/>
+          <p:cNvSpPr>
+            <a:spLocks noGrp="1"/>
+          </p:cNvSpPr>
+          <p:nvPr>
+            <p:ph type="body" idx="1"/>
+          </p:nvPr>
+        </p:nvSpPr>
+        <p:spPr/>
+        <p:txBody>
+          <a:bodyPr>
+            <a:normAutofit/>
+          </a:bodyPr>
+          <a:lstStyle/>
+          <a:p>
+            <a:r>
+              <a:rPr lang="en-US" sz="1200" b="0" i="0" kern="1200" dirty="0" err="1" smtClean="0">
+                <a:solidFill>
+                  <a:schemeClr val="tx1"/>
+                </a:solidFill>
+                <a:latin typeface="+mn-lt"/>
+                <a:ea typeface="+mn-ea"/>
+                <a:cs typeface="+mn-cs"/>
+              </a:rPr>
+              <a:t>Linting</a:t>
+            </a:r>
+            <a:r>
+              <a:rPr lang="en-US" sz="1200" b="0" i="0" kern="1200" dirty="0" smtClean="0">
+                <a:solidFill>
+                  <a:schemeClr val="tx1"/>
+                </a:solidFill>
+                <a:latin typeface="+mn-lt"/>
+                <a:ea typeface="+mn-ea"/>
+                <a:cs typeface="+mn-cs"/>
+              </a:rPr>
+              <a:t> is the process of running a program that will </a:t>
+            </a:r>
+            <a:r>
+              <a:rPr lang="en-US" sz="1200" b="0" i="0" kern="1200" dirty="0" err="1" smtClean="0">
+                <a:solidFill>
+                  <a:schemeClr val="tx1"/>
+                </a:solidFill>
+                <a:latin typeface="+mn-lt"/>
+                <a:ea typeface="+mn-ea"/>
+                <a:cs typeface="+mn-cs"/>
+              </a:rPr>
+              <a:t>analyse</a:t>
+            </a:r>
+            <a:r>
+              <a:rPr lang="en-US" sz="1200" b="0" i="0" kern="1200" smtClean="0">
+                <a:solidFill>
+                  <a:schemeClr val="tx1"/>
+                </a:solidFill>
+                <a:latin typeface="+mn-lt"/>
+                <a:ea typeface="+mn-ea"/>
+                <a:cs typeface="+mn-cs"/>
+              </a:rPr>
+              <a:t> code for potential errors.</a:t>
+            </a:r>
+            <a:endParaRPr lang="en-US"/>
+          </a:p>
+        </p:txBody>
+      </p:sp>
+      <p:sp>
+        <p:nvSpPr>
+          <p:cNvPr id="4" name="Slide Number Placeholder 3"/>
+          <p:cNvSpPr>
+            <a:spLocks noGrp="1"/>
+          </p:cNvSpPr>
+          <p:nvPr>
+            <p:ph type="sldNum" sz="quarter" idx="10"/>
+          </p:nvPr>
+        </p:nvSpPr>
+        <p:spPr/>
+        <p:txBody>
+          <a:bodyPr/>
+          <a:lstStyle/>
+          <a:p>
+            <a:fld id="{35845946-0CF3-4C0F-AF5C-F563F65A0652}" type="slidenum">
+              <a:rPr lang="en-US" smtClean="0"/>
+              <a:pPr/>
+              <a:t>4</a:t>
+            </a:fld>
+            <a:endParaRPr lang="en-US"/>
+          </a:p>
+        </p:txBody>
+      </p:sp>
+    </p:spTree>
   </p:cSld>
   <p:clrMapOvr>
     <a:masterClrMapping/>
@@ -926,7 +1305,7 @@
             <a:fld id="{8695E4D3-92F1-F74E-BDA8-3EA24612ADAC}" type="datetime2">
               <a:rPr lang="en-US" smtClean="0"/>
               <a:pPr/>
-              <a:t>Friday, May 20, 2016</a:t>
+              <a:t>Saturday, May 21, 2016</a:t>
             </a:fld>
             <a:endParaRPr lang="en-US"/>
           </a:p>
@@ -993,7 +1372,7 @@
     <a:masterClrMapping/>
   </p:clrMapOvr>
   <mc:AlternateContent xmlns:mc="http://schemas.openxmlformats.org/markup-compatibility/2006">
-    <mc:Choice xmlns:p14="http://schemas.microsoft.com/office/powerpoint/2010/main" xmlns="" Requires="p14">
+    <mc:Choice xmlns="" xmlns:p14="http://schemas.microsoft.com/office/powerpoint/2010/main" Requires="p14">
       <p:transition p14:dur="100">
         <p:cut/>
       </p:transition>
@@ -1121,7 +1500,7 @@
             <a:fld id="{9358C7B7-FC72-9D41-BEE1-BB86D4F232B4}" type="datetime2">
               <a:rPr lang="en-US" smtClean="0"/>
               <a:pPr/>
-              <a:t>Friday, May 20, 2016</a:t>
+              <a:t>Saturday, May 21, 2016</a:t>
             </a:fld>
             <a:endParaRPr lang="en-US"/>
           </a:p>
@@ -1188,7 +1567,7 @@
     <a:masterClrMapping/>
   </p:clrMapOvr>
   <mc:AlternateContent xmlns:mc="http://schemas.openxmlformats.org/markup-compatibility/2006">
-    <mc:Choice xmlns:p14="http://schemas.microsoft.com/office/powerpoint/2010/main" xmlns="" Requires="p14">
+    <mc:Choice xmlns="" xmlns:p14="http://schemas.microsoft.com/office/powerpoint/2010/main" Requires="p14">
       <p:transition p14:dur="100">
         <p:cut/>
       </p:transition>
@@ -1326,7 +1705,7 @@
             <a:fld id="{556E821B-96E8-764D-BF74-9827494534E4}" type="datetime2">
               <a:rPr lang="en-US" smtClean="0"/>
               <a:pPr/>
-              <a:t>Friday, May 20, 2016</a:t>
+              <a:t>Saturday, May 21, 2016</a:t>
             </a:fld>
             <a:endParaRPr lang="en-US"/>
           </a:p>
@@ -1393,7 +1772,7 @@
     <a:masterClrMapping/>
   </p:clrMapOvr>
   <mc:AlternateContent xmlns:mc="http://schemas.openxmlformats.org/markup-compatibility/2006">
-    <mc:Choice xmlns:p14="http://schemas.microsoft.com/office/powerpoint/2010/main" xmlns="" Requires="p14">
+    <mc:Choice xmlns="" xmlns:p14="http://schemas.microsoft.com/office/powerpoint/2010/main" Requires="p14">
       <p:transition p14:dur="100">
         <p:cut/>
       </p:transition>
@@ -1531,7 +1910,7 @@
             <a:fld id="{D8D89BD2-8F64-7D49-B0EC-A10964D418B9}" type="datetime2">
               <a:rPr lang="en-US" smtClean="0"/>
               <a:pPr/>
-              <a:t>Friday, May 20, 2016</a:t>
+              <a:t>Saturday, May 21, 2016</a:t>
             </a:fld>
             <a:endParaRPr lang="en-US"/>
           </a:p>
@@ -1598,7 +1977,7 @@
     <a:masterClrMapping/>
   </p:clrMapOvr>
   <mc:AlternateContent xmlns:mc="http://schemas.openxmlformats.org/markup-compatibility/2006">
-    <mc:Choice xmlns:p14="http://schemas.microsoft.com/office/powerpoint/2010/main" xmlns="" Requires="p14">
+    <mc:Choice xmlns="" xmlns:p14="http://schemas.microsoft.com/office/powerpoint/2010/main" Requires="p14">
       <p:transition p14:dur="100">
         <p:cut/>
       </p:transition>
@@ -1802,7 +2181,7 @@
             <a:fld id="{5166F277-A6C8-D74E-AD9A-DEDC5E2BD837}" type="datetime2">
               <a:rPr lang="en-US" smtClean="0"/>
               <a:pPr/>
-              <a:t>Friday, May 20, 2016</a:t>
+              <a:t>Saturday, May 21, 2016</a:t>
             </a:fld>
             <a:endParaRPr lang="en-US"/>
           </a:p>
@@ -1869,7 +2248,7 @@
     <a:masterClrMapping/>
   </p:clrMapOvr>
   <mc:AlternateContent xmlns:mc="http://schemas.openxmlformats.org/markup-compatibility/2006">
-    <mc:Choice xmlns:p14="http://schemas.microsoft.com/office/powerpoint/2010/main" xmlns="" Requires="p14">
+    <mc:Choice xmlns="" xmlns:p14="http://schemas.microsoft.com/office/powerpoint/2010/main" Requires="p14">
       <p:transition p14:dur="100">
         <p:cut/>
       </p:transition>
@@ -2120,7 +2499,7 @@
             <a:fld id="{68B6B04E-5C92-7445-BA45-A4E3769C0C5A}" type="datetime2">
               <a:rPr lang="en-US" smtClean="0"/>
               <a:pPr/>
-              <a:t>Friday, May 20, 2016</a:t>
+              <a:t>Saturday, May 21, 2016</a:t>
             </a:fld>
             <a:endParaRPr lang="en-US"/>
           </a:p>
@@ -2187,7 +2566,7 @@
     <a:masterClrMapping/>
   </p:clrMapOvr>
   <mc:AlternateContent xmlns:mc="http://schemas.openxmlformats.org/markup-compatibility/2006">
-    <mc:Choice xmlns:p14="http://schemas.microsoft.com/office/powerpoint/2010/main" xmlns="" Requires="p14">
+    <mc:Choice xmlns="" xmlns:p14="http://schemas.microsoft.com/office/powerpoint/2010/main" Requires="p14">
       <p:transition p14:dur="100">
         <p:cut/>
       </p:transition>
@@ -2572,7 +2951,7 @@
             <a:fld id="{A48670BD-E6C9-264B-B690-760DD144ACC6}" type="datetime2">
               <a:rPr lang="en-US" smtClean="0"/>
               <a:pPr/>
-              <a:t>Friday, May 20, 2016</a:t>
+              <a:t>Saturday, May 21, 2016</a:t>
             </a:fld>
             <a:endParaRPr lang="en-US"/>
           </a:p>
@@ -2639,7 +3018,7 @@
     <a:masterClrMapping/>
   </p:clrMapOvr>
   <mc:AlternateContent xmlns:mc="http://schemas.openxmlformats.org/markup-compatibility/2006">
-    <mc:Choice xmlns:p14="http://schemas.microsoft.com/office/powerpoint/2010/main" xmlns="" Requires="p14">
+    <mc:Choice xmlns="" xmlns:p14="http://schemas.microsoft.com/office/powerpoint/2010/main" Requires="p14">
       <p:transition p14:dur="100">
         <p:cut/>
       </p:transition>
@@ -2720,7 +3099,7 @@
             <a:fld id="{30675A36-41C1-3640-8C6B-1BC6AFC60484}" type="datetime2">
               <a:rPr lang="en-US" smtClean="0"/>
               <a:pPr/>
-              <a:t>Friday, May 20, 2016</a:t>
+              <a:t>Saturday, May 21, 2016</a:t>
             </a:fld>
             <a:endParaRPr lang="en-US"/>
           </a:p>
@@ -2787,7 +3166,7 @@
     <a:masterClrMapping/>
   </p:clrMapOvr>
   <mc:AlternateContent xmlns:mc="http://schemas.openxmlformats.org/markup-compatibility/2006">
-    <mc:Choice xmlns:p14="http://schemas.microsoft.com/office/powerpoint/2010/main" xmlns="" Requires="p14">
+    <mc:Choice xmlns="" xmlns:p14="http://schemas.microsoft.com/office/powerpoint/2010/main" Requires="p14">
       <p:transition p14:dur="100">
         <p:cut/>
       </p:transition>
@@ -2840,7 +3219,7 @@
             <a:fld id="{937F365B-D897-1947-952A-6C45D93ACDC1}" type="datetime2">
               <a:rPr lang="en-US" smtClean="0"/>
               <a:pPr/>
-              <a:t>Friday, May 20, 2016</a:t>
+              <a:t>Saturday, May 21, 2016</a:t>
             </a:fld>
             <a:endParaRPr lang="en-US"/>
           </a:p>
@@ -2907,7 +3286,7 @@
     <a:masterClrMapping/>
   </p:clrMapOvr>
   <mc:AlternateContent xmlns:mc="http://schemas.openxmlformats.org/markup-compatibility/2006">
-    <mc:Choice xmlns:p14="http://schemas.microsoft.com/office/powerpoint/2010/main" xmlns="" Requires="p14">
+    <mc:Choice xmlns="" xmlns:p14="http://schemas.microsoft.com/office/powerpoint/2010/main" Requires="p14">
       <p:transition p14:dur="100">
         <p:cut/>
       </p:transition>
@@ -3142,7 +3521,7 @@
             <a:fld id="{2BEF7792-C4C4-FC44-A7F5-725EC2CD30B1}" type="datetime2">
               <a:rPr lang="en-US" smtClean="0"/>
               <a:pPr/>
-              <a:t>Friday, May 20, 2016</a:t>
+              <a:t>Saturday, May 21, 2016</a:t>
             </a:fld>
             <a:endParaRPr lang="en-US"/>
           </a:p>
@@ -3209,7 +3588,7 @@
     <a:masterClrMapping/>
   </p:clrMapOvr>
   <mc:AlternateContent xmlns:mc="http://schemas.openxmlformats.org/markup-compatibility/2006">
-    <mc:Choice xmlns:p14="http://schemas.microsoft.com/office/powerpoint/2010/main" xmlns="" Requires="p14">
+    <mc:Choice xmlns="" xmlns:p14="http://schemas.microsoft.com/office/powerpoint/2010/main" Requires="p14">
       <p:transition p14:dur="100">
         <p:cut/>
       </p:transition>
@@ -3427,7 +3806,7 @@
             <a:fld id="{EC13829E-7EE3-3944-BE84-808F00A9FAF3}" type="datetime2">
               <a:rPr lang="en-US" smtClean="0"/>
               <a:pPr/>
-              <a:t>Friday, May 20, 2016</a:t>
+              <a:t>Saturday, May 21, 2016</a:t>
             </a:fld>
             <a:endParaRPr lang="en-US"/>
           </a:p>
@@ -3494,7 +3873,7 @@
     <a:masterClrMapping/>
   </p:clrMapOvr>
   <mc:AlternateContent xmlns:mc="http://schemas.openxmlformats.org/markup-compatibility/2006">
-    <mc:Choice xmlns:p14="http://schemas.microsoft.com/office/powerpoint/2010/main" xmlns="" Requires="p14">
+    <mc:Choice xmlns="" xmlns:p14="http://schemas.microsoft.com/office/powerpoint/2010/main" Requires="p14">
       <p:transition p14:dur="100">
         <p:cut/>
       </p:transition>
@@ -3693,7 +4072,7 @@
             <a:fld id="{92714F1E-B45D-F141-BCEC-0A4A490D9DB7}" type="datetime2">
               <a:rPr lang="en-US" smtClean="0"/>
               <a:pPr/>
-              <a:t>Friday, May 20, 2016</a:t>
+              <a:t>Saturday, May 21, 2016</a:t>
             </a:fld>
             <a:endParaRPr lang="en-US" dirty="0"/>
           </a:p>
@@ -3815,7 +4194,7 @@
     <p:sldLayoutId id="2147485506" r:id="rId11"/>
   </p:sldLayoutIdLst>
   <mc:AlternateContent xmlns:mc="http://schemas.openxmlformats.org/markup-compatibility/2006">
-    <mc:Choice xmlns:p14="http://schemas.microsoft.com/office/powerpoint/2010/main" xmlns="" Requires="p14">
+    <mc:Choice xmlns="" xmlns:p14="http://schemas.microsoft.com/office/powerpoint/2010/main" Requires="p14">
       <p:transition p14:dur="100">
         <p:cut/>
       </p:transition>
@@ -4252,7 +4631,6 @@
               <a:rPr lang="en-US" sz="5400" dirty="0" smtClean="0"/>
               <a:t>Yeoman</a:t>
             </a:r>
-            <a:endParaRPr lang="en-US" sz="5400" dirty="0" smtClean="0"/>
           </a:p>
         </p:txBody>
       </p:sp>
@@ -4544,7 +4922,7 @@
     </p:spTree>
     <p:extLst>
       <p:ext uri="{BB962C8B-B14F-4D97-AF65-F5344CB8AC3E}">
-        <p14:creationId xmlns:p14="http://schemas.microsoft.com/office/powerpoint/2010/main" xmlns="" val="1516866467"/>
+        <p14:creationId xmlns="" xmlns:p14="http://schemas.microsoft.com/office/powerpoint/2010/main" val="1516866467"/>
       </p:ext>
     </p:extLst>
   </p:cSld>
@@ -4552,7 +4930,7 @@
     <a:overrideClrMapping bg1="lt1" tx1="dk1" bg2="lt2" tx2="dk2" accent1="accent1" accent2="accent2" accent3="accent3" accent4="accent4" accent5="accent5" accent6="accent6" hlink="hlink" folHlink="folHlink"/>
   </p:clrMapOvr>
   <mc:AlternateContent xmlns:mc="http://schemas.openxmlformats.org/markup-compatibility/2006">
-    <mc:Choice xmlns:p14="http://schemas.microsoft.com/office/powerpoint/2010/main" xmlns="" Requires="p14">
+    <mc:Choice xmlns="" xmlns:p14="http://schemas.microsoft.com/office/powerpoint/2010/main" Requires="p14">
       <p:transition p14:dur="100">
         <p:cut/>
       </p:transition>
@@ -4627,7 +5005,7 @@
           <p:nvPr/>
         </p:nvPicPr>
         <p:blipFill>
-          <a:blip r:embed="rId2"/>
+          <a:blip r:embed="rId3"/>
           <a:srcRect/>
           <a:stretch>
             <a:fillRect/>
@@ -4675,29 +5053,81 @@
             <a:endParaRPr lang="en-US" dirty="0" smtClean="0"/>
           </a:p>
           <a:p>
+            <a:endParaRPr lang="en-US" dirty="0" smtClean="0"/>
+          </a:p>
+          <a:p>
+            <a:r>
+              <a:rPr lang="en-US" dirty="0" err="1" smtClean="0"/>
+              <a:t>Kickstart</a:t>
+            </a:r>
             <a:r>
               <a:rPr lang="en-US" dirty="0" smtClean="0"/>
-              <a:t>Help to </a:t>
+              <a:t> </a:t>
+            </a:r>
+            <a:r>
+              <a:rPr lang="en-US" dirty="0" smtClean="0"/>
+              <a:t>new </a:t>
+            </a:r>
+            <a:r>
+              <a:rPr lang="en-US" dirty="0" smtClean="0"/>
+              <a:t>projects productively</a:t>
+            </a:r>
+            <a:endParaRPr lang="en-US" dirty="0" smtClean="0"/>
+          </a:p>
+          <a:p>
+            <a:endParaRPr lang="en-US" dirty="0" smtClean="0"/>
+          </a:p>
+          <a:p>
+            <a:r>
+              <a:rPr lang="en-US" dirty="0" smtClean="0"/>
+              <a:t>Provide </a:t>
+            </a:r>
+            <a:r>
+              <a:rPr lang="en-US" dirty="0" smtClean="0"/>
+              <a:t>best </a:t>
+            </a:r>
+            <a:r>
+              <a:rPr lang="en-US" dirty="0" smtClean="0"/>
+              <a:t>practices, </a:t>
+            </a:r>
+            <a:r>
+              <a:rPr lang="en-US" dirty="0" smtClean="0"/>
+              <a:t>workflow, generator</a:t>
+            </a:r>
+            <a:r>
+              <a:rPr lang="en-US" dirty="0" smtClean="0"/>
+              <a:t> &amp; tools</a:t>
+            </a:r>
+          </a:p>
+          <a:p>
+            <a:endParaRPr lang="en-US" dirty="0" smtClean="0"/>
+          </a:p>
+          <a:p>
+            <a:r>
+              <a:rPr lang="en-US" dirty="0" smtClean="0"/>
+              <a:t>Support </a:t>
             </a:r>
             <a:r>
               <a:rPr lang="en-US" dirty="0" err="1" smtClean="0"/>
-              <a:t>kickstart</a:t>
+              <a:t>linting</a:t>
             </a:r>
             <a:r>
               <a:rPr lang="en-US" dirty="0" smtClean="0"/>
-              <a:t> new projects</a:t>
-            </a:r>
-            <a:r>
-              <a:rPr lang="en-US" smtClean="0"/>
-              <a:t>, </a:t>
-            </a:r>
-            <a:r>
-              <a:rPr lang="en-US" smtClean="0"/>
-              <a:t>provide best </a:t>
-            </a:r>
+              <a:t>, testing, </a:t>
+            </a:r>
+            <a:r>
+              <a:rPr lang="en-US" dirty="0" err="1" smtClean="0"/>
+              <a:t>minification</a:t>
+            </a:r>
+            <a:endParaRPr lang="en-US" dirty="0" smtClean="0"/>
+          </a:p>
+          <a:p>
+            <a:endParaRPr lang="en-US" dirty="0" smtClean="0"/>
+          </a:p>
+          <a:p>
             <a:r>
               <a:rPr lang="en-US" dirty="0" smtClean="0"/>
-              <a:t>practices and tools to help you stay productive</a:t>
+              <a:t>and much more…</a:t>
             </a:r>
             <a:endParaRPr lang="en-US" dirty="0"/>
           </a:p>
@@ -4709,7 +5139,7 @@
     <a:masterClrMapping/>
   </p:clrMapOvr>
   <mc:AlternateContent xmlns:mc="http://schemas.openxmlformats.org/markup-compatibility/2006">
-    <mc:Choice xmlns:p14="http://schemas.microsoft.com/office/powerpoint/2010/main" xmlns="" Requires="p14">
+    <mc:Choice xmlns="" xmlns:p14="http://schemas.microsoft.com/office/powerpoint/2010/main" Requires="p14">
       <p:transition p14:dur="100">
         <p:cut/>
       </p:transition>
@@ -4757,22 +5187,27 @@
             <p:ph type="title"/>
           </p:nvPr>
         </p:nvSpPr>
-        <p:spPr/>
+        <p:spPr>
+          <a:xfrm>
+            <a:off x="547396" y="163286"/>
+            <a:ext cx="8229600" cy="739014"/>
+          </a:xfrm>
+        </p:spPr>
         <p:txBody>
           <a:bodyPr/>
           <a:lstStyle/>
           <a:p>
             <a:r>
-              <a:rPr lang="en-US" smtClean="0"/>
-              <a:t>OUTLINE</a:t>
-            </a:r>
-            <a:endParaRPr lang="en-US"/>
-          </a:p>
-        </p:txBody>
-      </p:sp>
-      <p:sp>
-        <p:nvSpPr>
-          <p:cNvPr id="3" name="Content Placeholder 2"/>
+              <a:rPr lang="en-US" dirty="0" smtClean="0"/>
+              <a:t>Yeoman tools</a:t>
+            </a:r>
+            <a:endParaRPr lang="en-US" dirty="0"/>
+          </a:p>
+        </p:txBody>
+      </p:sp>
+      <p:sp>
+        <p:nvSpPr>
+          <p:cNvPr id="7" name="Content Placeholder 6"/>
           <p:cNvSpPr>
             <a:spLocks noGrp="1"/>
           </p:cNvSpPr>
@@ -4782,138 +5217,125 @@
         </p:nvSpPr>
         <p:spPr>
           <a:xfrm>
-            <a:off x="457199" y="2273304"/>
-            <a:ext cx="3788229" cy="4157663"/>
+            <a:off x="547396" y="1850571"/>
+            <a:ext cx="8229600" cy="4157663"/>
           </a:xfrm>
         </p:spPr>
         <p:txBody>
           <a:bodyPr/>
           <a:lstStyle/>
           <a:p>
-            <a:r>
-              <a:rPr lang="en-US" sz="2800" dirty="0" smtClean="0"/>
-              <a:t>What is </a:t>
-            </a:r>
-            <a:r>
-              <a:rPr lang="en-US" sz="2800" dirty="0" err="1" smtClean="0"/>
-              <a:t>AngularJS</a:t>
-            </a:r>
-            <a:endParaRPr lang="en-US" sz="2800" dirty="0" smtClean="0"/>
-          </a:p>
-          <a:p>
-            <a:r>
-              <a:rPr lang="en-US" sz="2800" dirty="0" smtClean="0"/>
-              <a:t>Why use </a:t>
-            </a:r>
-            <a:r>
-              <a:rPr lang="en-US" sz="2800" dirty="0" err="1" smtClean="0"/>
-              <a:t>AngularJS</a:t>
-            </a:r>
-            <a:endParaRPr lang="en-US" sz="2800" dirty="0" smtClean="0"/>
-          </a:p>
-          <a:p>
-            <a:r>
-              <a:rPr lang="en-US" sz="2800" dirty="0" smtClean="0"/>
-              <a:t>Core Features</a:t>
-            </a:r>
-          </a:p>
-          <a:p>
-            <a:r>
-              <a:rPr lang="en-US" sz="2800" dirty="0" smtClean="0"/>
-              <a:t>Two-way data binding</a:t>
-            </a:r>
-          </a:p>
-          <a:p>
-            <a:r>
-              <a:rPr lang="en-US" sz="2800" dirty="0" smtClean="0"/>
-              <a:t>Modules</a:t>
-            </a:r>
-          </a:p>
-          <a:p>
-            <a:endParaRPr lang="en-US" sz="2800" dirty="0" smtClean="0"/>
-          </a:p>
-        </p:txBody>
-      </p:sp>
-      <p:sp>
-        <p:nvSpPr>
-          <p:cNvPr id="4" name="Rectangle 3"/>
-          <p:cNvSpPr/>
+            <a:endParaRPr lang="en-US" dirty="0" smtClean="0"/>
+          </a:p>
+          <a:p>
+            <a:endParaRPr lang="en-US" dirty="0" smtClean="0"/>
+          </a:p>
+          <a:p>
+            <a:endParaRPr lang="en-US" dirty="0" smtClean="0"/>
+          </a:p>
+          <a:p>
+            <a:r>
+              <a:rPr lang="en-US" b="1" dirty="0" smtClean="0"/>
+              <a:t>Scaffolding tool</a:t>
+            </a:r>
+            <a:r>
+              <a:rPr lang="en-US" dirty="0" smtClean="0"/>
+              <a:t> for </a:t>
+            </a:r>
+            <a:r>
+              <a:rPr lang="en-US" dirty="0" err="1" smtClean="0"/>
+              <a:t>contruct</a:t>
+            </a:r>
+            <a:r>
+              <a:rPr lang="en-US" dirty="0" smtClean="0"/>
+              <a:t> new app (</a:t>
+            </a:r>
+            <a:r>
+              <a:rPr lang="en-US" dirty="0" err="1" smtClean="0"/>
+              <a:t>Yo</a:t>
+            </a:r>
+            <a:r>
+              <a:rPr lang="en-US" dirty="0" smtClean="0"/>
+              <a:t>)</a:t>
+            </a:r>
+          </a:p>
+          <a:p>
+            <a:endParaRPr lang="en-US" dirty="0" smtClean="0"/>
+          </a:p>
+          <a:p>
+            <a:r>
+              <a:rPr lang="en-US" b="1" dirty="0" smtClean="0"/>
+              <a:t>Build system</a:t>
+            </a:r>
+            <a:r>
+              <a:rPr lang="en-US" dirty="0" smtClean="0"/>
+              <a:t> for build, preview, test</a:t>
+            </a:r>
+            <a:r>
+              <a:rPr lang="en-US" dirty="0" smtClean="0"/>
+              <a:t> </a:t>
+            </a:r>
+            <a:r>
+              <a:rPr lang="en-US" dirty="0" smtClean="0"/>
+              <a:t>(Grunt, Gulp)</a:t>
+            </a:r>
+          </a:p>
+          <a:p>
+            <a:endParaRPr lang="en-US" dirty="0" smtClean="0"/>
+          </a:p>
+          <a:p>
+            <a:r>
+              <a:rPr lang="en-US" b="1" dirty="0" smtClean="0"/>
+              <a:t>Package manager</a:t>
+            </a:r>
+            <a:r>
+              <a:rPr lang="en-US" dirty="0" smtClean="0"/>
+              <a:t> for dependency management (Bower, </a:t>
+            </a:r>
+            <a:r>
+              <a:rPr lang="en-US" dirty="0" err="1" smtClean="0"/>
+              <a:t>npm</a:t>
+            </a:r>
+            <a:r>
+              <a:rPr lang="en-US" dirty="0" smtClean="0"/>
+              <a:t>)</a:t>
+            </a:r>
+          </a:p>
+        </p:txBody>
+      </p:sp>
+      <p:pic>
+        <p:nvPicPr>
+          <p:cNvPr id="1027" name="Picture 3" descr="C:\Users\sonvq\Desktop\toolset.png"/>
+          <p:cNvPicPr>
+            <a:picLocks noChangeAspect="1" noChangeArrowheads="1"/>
+          </p:cNvPicPr>
           <p:nvPr/>
-        </p:nvSpPr>
-        <p:spPr>
+        </p:nvPicPr>
+        <p:blipFill>
+          <a:blip r:embed="rId3"/>
+          <a:srcRect/>
+          <a:stretch>
+            <a:fillRect/>
+          </a:stretch>
+        </p:blipFill>
+        <p:spPr bwMode="auto">
           <a:xfrm>
-            <a:off x="4898571" y="2229760"/>
-            <a:ext cx="4572000" cy="2554545"/>
+            <a:off x="2324100" y="902300"/>
+            <a:ext cx="5112313" cy="2056039"/>
           </a:xfrm>
           <a:prstGeom prst="rect">
             <a:avLst/>
           </a:prstGeom>
+          <a:noFill/>
         </p:spPr>
-        <p:txBody>
-          <a:bodyPr>
-            <a:spAutoFit/>
-          </a:bodyPr>
-          <a:lstStyle/>
-          <a:p>
-            <a:pPr marL="514350" indent="-514350">
-              <a:buFont typeface="Arial" pitchFamily="34" charset="0"/>
-              <a:buChar char="•"/>
-            </a:pPr>
-            <a:r>
-              <a:rPr lang="en-US" sz="3200" smtClean="0"/>
-              <a:t>Controllers</a:t>
-            </a:r>
-          </a:p>
-          <a:p>
-            <a:pPr marL="514350" indent="-514350">
-              <a:buFont typeface="Arial" pitchFamily="34" charset="0"/>
-              <a:buChar char="•"/>
-            </a:pPr>
-            <a:r>
-              <a:rPr lang="en-US" sz="3200" smtClean="0"/>
-              <a:t>Directive</a:t>
-            </a:r>
-          </a:p>
-          <a:p>
-            <a:pPr marL="514350" indent="-514350">
-              <a:buFont typeface="Arial" pitchFamily="34" charset="0"/>
-              <a:buChar char="•"/>
-            </a:pPr>
-            <a:r>
-              <a:rPr lang="en-US" sz="3200" smtClean="0"/>
-              <a:t>Expresstion</a:t>
-            </a:r>
-          </a:p>
-          <a:p>
-            <a:pPr marL="514350" indent="-514350">
-              <a:buFont typeface="Arial" pitchFamily="34" charset="0"/>
-              <a:buChar char="•"/>
-            </a:pPr>
-            <a:r>
-              <a:rPr lang="en-US" sz="3200" smtClean="0"/>
-              <a:t>DI</a:t>
-            </a:r>
-          </a:p>
-          <a:p>
-            <a:pPr marL="514350" indent="-514350">
-              <a:buFont typeface="Arial" pitchFamily="34" charset="0"/>
-              <a:buChar char="•"/>
-            </a:pPr>
-            <a:r>
-              <a:rPr lang="en-US" sz="3200" smtClean="0"/>
-              <a:t>Topics</a:t>
-            </a:r>
-            <a:endParaRPr lang="en-US" sz="3200"/>
-          </a:p>
-        </p:txBody>
-      </p:sp>
+      </p:pic>
     </p:spTree>
   </p:cSld>
   <p:clrMapOvr>
     <a:masterClrMapping/>
   </p:clrMapOvr>
   <mc:AlternateContent xmlns:mc="http://schemas.openxmlformats.org/markup-compatibility/2006">
-    <mc:Choice xmlns:p14="http://schemas.microsoft.com/office/powerpoint/2010/main" xmlns="" Requires="p14">
+    <mc:Choice xmlns="" xmlns:p14="http://schemas.microsoft.com/office/powerpoint/2010/main" Requires="p14">
       <p:transition p14:dur="100">
         <p:cut/>
       </p:transition>
@@ -4958,6 +5380,173 @@
             <a:spLocks noGrp="1"/>
           </p:cNvSpPr>
           <p:nvPr>
+            <p:ph type="title"/>
+          </p:nvPr>
+        </p:nvSpPr>
+        <p:spPr>
+          <a:xfrm>
+            <a:off x="547396" y="163286"/>
+            <a:ext cx="8229600" cy="739014"/>
+          </a:xfrm>
+        </p:spPr>
+        <p:txBody>
+          <a:bodyPr/>
+          <a:lstStyle/>
+          <a:p>
+            <a:r>
+              <a:rPr lang="en-US" dirty="0" smtClean="0"/>
+              <a:t>Yeoman </a:t>
+            </a:r>
+            <a:r>
+              <a:rPr lang="en-US" dirty="0" err="1" smtClean="0"/>
+              <a:t>Cmd</a:t>
+            </a:r>
+            <a:endParaRPr lang="en-US" dirty="0"/>
+          </a:p>
+        </p:txBody>
+      </p:sp>
+      <p:sp>
+        <p:nvSpPr>
+          <p:cNvPr id="7" name="Content Placeholder 6"/>
+          <p:cNvSpPr>
+            <a:spLocks noGrp="1"/>
+          </p:cNvSpPr>
+          <p:nvPr>
+            <p:ph idx="1"/>
+          </p:nvPr>
+        </p:nvSpPr>
+        <p:spPr>
+          <a:xfrm>
+            <a:off x="547396" y="1850571"/>
+            <a:ext cx="8229600" cy="4157663"/>
+          </a:xfrm>
+        </p:spPr>
+        <p:txBody>
+          <a:bodyPr/>
+          <a:lstStyle/>
+          <a:p>
+            <a:r>
+              <a:rPr lang="en-US" dirty="0" err="1" smtClean="0"/>
+              <a:t>npm</a:t>
+            </a:r>
+            <a:r>
+              <a:rPr lang="en-US" dirty="0" smtClean="0"/>
+              <a:t> install </a:t>
+            </a:r>
+            <a:r>
+              <a:rPr lang="en-US" dirty="0" err="1" smtClean="0"/>
+              <a:t>yo</a:t>
+            </a:r>
+            <a:r>
+              <a:rPr lang="en-US" dirty="0" smtClean="0"/>
+              <a:t> –g</a:t>
+            </a:r>
+          </a:p>
+          <a:p>
+            <a:endParaRPr lang="en-US" dirty="0" smtClean="0"/>
+          </a:p>
+          <a:p>
+            <a:r>
+              <a:rPr lang="en-US" dirty="0" err="1" smtClean="0"/>
+              <a:t>npm</a:t>
+            </a:r>
+            <a:r>
+              <a:rPr lang="en-US" dirty="0" smtClean="0"/>
+              <a:t> install generator-</a:t>
+            </a:r>
+            <a:r>
+              <a:rPr lang="en-US" dirty="0" err="1" smtClean="0"/>
+              <a:t>webapp</a:t>
+            </a:r>
+            <a:r>
+              <a:rPr lang="en-US" dirty="0" smtClean="0"/>
+              <a:t> –g</a:t>
+            </a:r>
+          </a:p>
+          <a:p>
+            <a:endParaRPr lang="en-US" dirty="0" smtClean="0"/>
+          </a:p>
+          <a:p>
+            <a:r>
+              <a:rPr lang="en-US" dirty="0" err="1" smtClean="0"/>
+              <a:t>yo</a:t>
+            </a:r>
+            <a:r>
+              <a:rPr lang="en-US" dirty="0" smtClean="0"/>
+              <a:t> </a:t>
+            </a:r>
+            <a:r>
+              <a:rPr lang="en-US" dirty="0" err="1" smtClean="0"/>
+              <a:t>webapp</a:t>
+            </a:r>
+            <a:endParaRPr lang="en-US" dirty="0" smtClean="0"/>
+          </a:p>
+          <a:p>
+            <a:endParaRPr lang="en-US" dirty="0" smtClean="0"/>
+          </a:p>
+          <a:p>
+            <a:r>
+              <a:rPr lang="en-US" smtClean="0"/>
+              <a:t>grunt </a:t>
+            </a:r>
+            <a:r>
+              <a:rPr lang="en-US" dirty="0" smtClean="0"/>
+              <a:t>server</a:t>
+            </a:r>
+          </a:p>
+        </p:txBody>
+      </p:sp>
+    </p:spTree>
+  </p:cSld>
+  <p:clrMapOvr>
+    <a:masterClrMapping/>
+  </p:clrMapOvr>
+  <mc:AlternateContent xmlns:mc="http://schemas.openxmlformats.org/markup-compatibility/2006">
+    <mc:Choice xmlns="" xmlns:p14="http://schemas.microsoft.com/office/powerpoint/2010/main" Requires="p14">
+      <p:transition p14:dur="100">
+        <p:cut/>
+      </p:transition>
+    </mc:Choice>
+    <mc:Fallback>
+      <p:transition>
+        <p:cut/>
+      </p:transition>
+    </mc:Fallback>
+  </mc:AlternateContent>
+  <p:timing>
+    <p:tnLst>
+      <p:par>
+        <p:cTn id="1" dur="indefinite" restart="never" nodeType="tmRoot"/>
+      </p:par>
+    </p:tnLst>
+  </p:timing>
+</p:sld>
+</file>
+
+<file path=ppt/slides/slide5.xml><?xml version="1.0" encoding="utf-8"?>
+<p:sld xmlns:a="http://schemas.openxmlformats.org/drawingml/2006/main" xmlns:r="http://schemas.openxmlformats.org/officeDocument/2006/relationships" xmlns:p="http://schemas.openxmlformats.org/presentationml/2006/main">
+  <p:cSld>
+    <p:spTree>
+      <p:nvGrpSpPr>
+        <p:cNvPr id="1" name=""/>
+        <p:cNvGrpSpPr/>
+        <p:nvPr/>
+      </p:nvGrpSpPr>
+      <p:grpSpPr>
+        <a:xfrm>
+          <a:off x="0" y="0"/>
+          <a:ext cx="0" cy="0"/>
+          <a:chOff x="0" y="0"/>
+          <a:chExt cx="0" cy="0"/>
+        </a:xfrm>
+      </p:grpSpPr>
+      <p:sp>
+        <p:nvSpPr>
+          <p:cNvPr id="2" name="Title 1"/>
+          <p:cNvSpPr>
+            <a:spLocks noGrp="1"/>
+          </p:cNvSpPr>
+          <p:nvPr>
             <p:ph type="ctrTitle"/>
           </p:nvPr>
         </p:nvSpPr>
@@ -5015,7 +5604,7 @@
     </p:spTree>
     <p:extLst>
       <p:ext uri="{BB962C8B-B14F-4D97-AF65-F5344CB8AC3E}">
-        <p14:creationId xmlns:p14="http://schemas.microsoft.com/office/powerpoint/2010/main" xmlns="" val="3137979333"/>
+        <p14:creationId xmlns="" xmlns:p14="http://schemas.microsoft.com/office/powerpoint/2010/main" val="3137979333"/>
       </p:ext>
     </p:extLst>
   </p:cSld>
@@ -5023,7 +5612,7 @@
     <a:masterClrMapping/>
   </p:clrMapOvr>
   <mc:AlternateContent xmlns:mc="http://schemas.openxmlformats.org/markup-compatibility/2006">
-    <mc:Choice xmlns:p14="http://schemas.microsoft.com/office/powerpoint/2010/main" xmlns="" Requires="p14">
+    <mc:Choice xmlns="" xmlns:p14="http://schemas.microsoft.com/office/powerpoint/2010/main" Requires="p14">
       <p:transition p14:dur="100">
         <p:cut/>
       </p:transition>

</xml_diff>